<commit_message>
Minor updates to make live discussion easier (shorter names)
</commit_message>
<xml_diff>
--- a/- Slides/CS301_Bootcamp_Pointer Practice - blank.pptx
+++ b/- Slides/CS301_Bootcamp_Pointer Practice - blank.pptx
@@ -255,7 +255,7 @@
           <a:p>
             <a:fld id="{926EFF37-F014-4521-A06F-4A8E9D19C3DA}" type="datetimeFigureOut">
               <a:rPr lang="en-US" smtClean="0"/>
-              <a:t>1/26/2024</a:t>
+              <a:t>7/4/2025</a:t>
             </a:fld>
             <a:endParaRPr lang="en-US"/>
           </a:p>
@@ -790,7 +790,7 @@
           <a:p>
             <a:fld id="{E858DF5E-E190-4D5F-A5F2-64F7683874EB}" type="datetime1">
               <a:rPr lang="en-US" smtClean="0"/>
-              <a:t>1/26/2024</a:t>
+              <a:t>7/4/2025</a:t>
             </a:fld>
             <a:endParaRPr lang="en-US"/>
           </a:p>
@@ -958,7 +958,7 @@
           <a:p>
             <a:fld id="{60501019-F0BF-41D0-83CC-6F0C04DDBFB2}" type="datetime1">
               <a:rPr lang="en-US" smtClean="0"/>
-              <a:t>1/26/2024</a:t>
+              <a:t>7/4/2025</a:t>
             </a:fld>
             <a:endParaRPr lang="en-US"/>
           </a:p>
@@ -1136,7 +1136,7 @@
           <a:p>
             <a:fld id="{42190BEA-DEB8-4F26-8C00-592512014478}" type="datetime1">
               <a:rPr lang="en-US" smtClean="0"/>
-              <a:t>1/26/2024</a:t>
+              <a:t>7/4/2025</a:t>
             </a:fld>
             <a:endParaRPr lang="en-US"/>
           </a:p>
@@ -1304,7 +1304,7 @@
           <a:p>
             <a:fld id="{100065C6-AED9-4522-A6DC-FF99D2E8A7B1}" type="datetime1">
               <a:rPr lang="en-US" smtClean="0"/>
-              <a:t>1/26/2024</a:t>
+              <a:t>7/4/2025</a:t>
             </a:fld>
             <a:endParaRPr lang="en-US"/>
           </a:p>
@@ -1549,7 +1549,7 @@
           <a:p>
             <a:fld id="{B19D355D-ADD5-41AF-8DF3-FB28C7C96ED8}" type="datetime1">
               <a:rPr lang="en-US" smtClean="0"/>
-              <a:t>1/26/2024</a:t>
+              <a:t>7/4/2025</a:t>
             </a:fld>
             <a:endParaRPr lang="en-US"/>
           </a:p>
@@ -1834,7 +1834,7 @@
           <a:p>
             <a:fld id="{D0ECDD7C-A8FF-48C8-B31C-92D7E570ABBA}" type="datetime1">
               <a:rPr lang="en-US" smtClean="0"/>
-              <a:t>1/26/2024</a:t>
+              <a:t>7/4/2025</a:t>
             </a:fld>
             <a:endParaRPr lang="en-US"/>
           </a:p>
@@ -2253,7 +2253,7 @@
           <a:p>
             <a:fld id="{B760C296-9831-4C60-8E2C-2AC103FA2D9D}" type="datetime1">
               <a:rPr lang="en-US" smtClean="0"/>
-              <a:t>1/26/2024</a:t>
+              <a:t>7/4/2025</a:t>
             </a:fld>
             <a:endParaRPr lang="en-US"/>
           </a:p>
@@ -2370,7 +2370,7 @@
           <a:p>
             <a:fld id="{CA59355B-5FF1-4542-B909-F7A08901B431}" type="datetime1">
               <a:rPr lang="en-US" smtClean="0"/>
-              <a:t>1/26/2024</a:t>
+              <a:t>7/4/2025</a:t>
             </a:fld>
             <a:endParaRPr lang="en-US"/>
           </a:p>
@@ -2465,7 +2465,7 @@
           <a:p>
             <a:fld id="{C88F74DB-E819-4F03-8C1C-F2C474C14159}" type="datetime1">
               <a:rPr lang="en-US" smtClean="0"/>
-              <a:t>1/26/2024</a:t>
+              <a:t>7/4/2025</a:t>
             </a:fld>
             <a:endParaRPr lang="en-US"/>
           </a:p>
@@ -2740,7 +2740,7 @@
           <a:p>
             <a:fld id="{AE57373B-F239-4723-9024-EF21B378BE6D}" type="datetime1">
               <a:rPr lang="en-US" smtClean="0"/>
-              <a:t>1/26/2024</a:t>
+              <a:t>7/4/2025</a:t>
             </a:fld>
             <a:endParaRPr lang="en-US"/>
           </a:p>
@@ -2992,7 +2992,7 @@
           <a:p>
             <a:fld id="{C0DCE26A-44E1-47EF-A1CA-D2402539CAA1}" type="datetime1">
               <a:rPr lang="en-US" smtClean="0"/>
-              <a:t>1/26/2024</a:t>
+              <a:t>7/4/2025</a:t>
             </a:fld>
             <a:endParaRPr lang="en-US"/>
           </a:p>
@@ -3203,7 +3203,7 @@
           <a:p>
             <a:fld id="{162E5927-59DC-463B-9D56-1A61655AEB62}" type="datetime1">
               <a:rPr lang="en-US" smtClean="0"/>
-              <a:t>1/26/2024</a:t>
+              <a:t>7/4/2025</a:t>
             </a:fld>
             <a:endParaRPr lang="en-US"/>
           </a:p>
@@ -11743,7 +11743,7 @@
                 <a:latin typeface="Courier New" panose="02070309020205020404" pitchFamily="49" charset="0"/>
                 <a:cs typeface="Courier New" panose="02070309020205020404" pitchFamily="49" charset="0"/>
               </a:rPr>
-              <a:t>luckyNumber</a:t>
+              <a:t>luckyNum</a:t>
             </a:r>
             <a:r>
               <a:rPr lang="en-US" sz="1400" dirty="0">
@@ -11785,7 +11785,7 @@
                 <a:latin typeface="Courier New" panose="02070309020205020404" pitchFamily="49" charset="0"/>
                 <a:cs typeface="Courier New" panose="02070309020205020404" pitchFamily="49" charset="0"/>
               </a:rPr>
-              <a:t>mysteryNumber</a:t>
+              <a:t>mysteryNum</a:t>
             </a:r>
             <a:r>
               <a:rPr lang="en-US" sz="1400" dirty="0">
@@ -11826,7 +11826,7 @@
                 <a:latin typeface="Courier New" panose="02070309020205020404" pitchFamily="49" charset="0"/>
                 <a:cs typeface="Courier New" panose="02070309020205020404" pitchFamily="49" charset="0"/>
               </a:rPr>
-              <a:t>mysteryNumber</a:t>
+              <a:t>mysteryNum</a:t>
             </a:r>
             <a:r>
               <a:rPr lang="en-US" sz="1400" dirty="0">
@@ -11858,7 +11858,7 @@
                 <a:latin typeface="Courier New" panose="02070309020205020404" pitchFamily="49" charset="0"/>
                 <a:cs typeface="Courier New" panose="02070309020205020404" pitchFamily="49" charset="0"/>
               </a:rPr>
-              <a:t>luckyNumber</a:t>
+              <a:t>luckyNum</a:t>
             </a:r>
             <a:r>
               <a:rPr lang="en-US" sz="1400" dirty="0">
@@ -11902,7 +11902,7 @@
                 <a:latin typeface="Courier New" panose="02070309020205020404" pitchFamily="49" charset="0"/>
                 <a:cs typeface="Courier New" panose="02070309020205020404" pitchFamily="49" charset="0"/>
               </a:rPr>
-              <a:t>luckyNumber</a:t>
+              <a:t>luckyNum</a:t>
             </a:r>
             <a:r>
               <a:rPr lang="en-US" sz="1400" dirty="0">
@@ -12363,7 +12363,7 @@
                 <a:latin typeface="Courier New" panose="02070309020205020404" pitchFamily="49" charset="0"/>
                 <a:cs typeface="Courier New" panose="02070309020205020404" pitchFamily="49" charset="0"/>
               </a:rPr>
-              <a:t>mysteryNumber</a:t>
+              <a:t>mysteryNum</a:t>
             </a:r>
             <a:r>
               <a:rPr lang="en-US" sz="1400" dirty="0">
@@ -12714,7 +12714,7 @@
                 <a:latin typeface="Courier New" panose="02070309020205020404" pitchFamily="49" charset="0"/>
                 <a:cs typeface="Courier New" panose="02070309020205020404" pitchFamily="49" charset="0"/>
               </a:rPr>
-              <a:t>luckyNumber</a:t>
+              <a:t>luckyNum</a:t>
             </a:r>
             <a:r>
               <a:rPr lang="en-US" sz="1400" dirty="0">
@@ -12756,7 +12756,7 @@
                 <a:latin typeface="Courier New" panose="02070309020205020404" pitchFamily="49" charset="0"/>
                 <a:cs typeface="Courier New" panose="02070309020205020404" pitchFamily="49" charset="0"/>
               </a:rPr>
-              <a:t>mysteryNumber</a:t>
+              <a:t>mysteryNum</a:t>
             </a:r>
             <a:r>
               <a:rPr lang="en-US" sz="1400" dirty="0">
@@ -12797,7 +12797,7 @@
                 <a:latin typeface="Courier New" panose="02070309020205020404" pitchFamily="49" charset="0"/>
                 <a:cs typeface="Courier New" panose="02070309020205020404" pitchFamily="49" charset="0"/>
               </a:rPr>
-              <a:t>mysteryNumber</a:t>
+              <a:t>mysteryNum</a:t>
             </a:r>
             <a:r>
               <a:rPr lang="en-US" sz="1400" dirty="0">
@@ -12829,7 +12829,7 @@
                 <a:latin typeface="Courier New" panose="02070309020205020404" pitchFamily="49" charset="0"/>
                 <a:cs typeface="Courier New" panose="02070309020205020404" pitchFamily="49" charset="0"/>
               </a:rPr>
-              <a:t>luckyNumber</a:t>
+              <a:t>luckyNum</a:t>
             </a:r>
             <a:r>
               <a:rPr lang="en-US" sz="1400" dirty="0">
@@ -12873,7 +12873,7 @@
                 <a:latin typeface="Courier New" panose="02070309020205020404" pitchFamily="49" charset="0"/>
                 <a:cs typeface="Courier New" panose="02070309020205020404" pitchFamily="49" charset="0"/>
               </a:rPr>
-              <a:t>luckyNumber</a:t>
+              <a:t>luckyNum</a:t>
             </a:r>
             <a:r>
               <a:rPr lang="en-US" sz="1400" dirty="0">
@@ -13334,7 +13334,7 @@
                 <a:latin typeface="Courier New" panose="02070309020205020404" pitchFamily="49" charset="0"/>
                 <a:cs typeface="Courier New" panose="02070309020205020404" pitchFamily="49" charset="0"/>
               </a:rPr>
-              <a:t>mysteryNumber</a:t>
+              <a:t>mysteryNum</a:t>
             </a:r>
             <a:r>
               <a:rPr lang="en-US" sz="1400" dirty="0">
@@ -14008,7 +14008,7 @@
                 <a:ea typeface="JetBrains Mono"/>
                 <a:cs typeface="Courier New" panose="02070309020205020404" pitchFamily="49" charset="0"/>
               </a:rPr>
-              <a:t>superSecretNum</a:t>
+              <a:t>secretNum</a:t>
             </a:r>
             <a:r>
               <a:rPr kumimoji="0" lang="en-US" altLang="en-US" sz="1600" b="0" i="0" u="none" strike="noStrike" cap="none" normalizeH="0" baseline="0" dirty="0">
@@ -14215,7 +14215,7 @@
                 <a:ea typeface="JetBrains Mono"/>
                 <a:cs typeface="Courier New" panose="02070309020205020404" pitchFamily="49" charset="0"/>
               </a:rPr>
-              <a:t>superSecretNum</a:t>
+              <a:t>secretNum</a:t>
             </a:r>
             <a:r>
               <a:rPr kumimoji="0" lang="en-US" altLang="en-US" sz="1600" b="0" i="0" u="none" strike="noStrike" cap="none" normalizeH="0" baseline="0" dirty="0">
@@ -14530,6 +14530,17 @@
               <a:t>* </a:t>
             </a:r>
             <a:r>
+              <a:rPr lang="en-US" altLang="en-US" sz="1600" dirty="0" err="1">
+                <a:solidFill>
+                  <a:srgbClr val="000000"/>
+                </a:solidFill>
+                <a:latin typeface="Courier New" panose="02070309020205020404" pitchFamily="49" charset="0"/>
+                <a:ea typeface="JetBrains Mono"/>
+                <a:cs typeface="Courier New" panose="02070309020205020404" pitchFamily="49" charset="0"/>
+              </a:rPr>
+              <a:t>s</a:t>
+            </a:r>
+            <a:r>
               <a:rPr kumimoji="0" lang="en-US" altLang="en-US" sz="1600" b="0" i="0" u="none" strike="noStrike" cap="none" normalizeH="0" baseline="0" dirty="0" err="1">
                 <a:ln>
                   <a:noFill/>
@@ -14542,7 +14553,7 @@
                 <a:ea typeface="JetBrains Mono"/>
                 <a:cs typeface="Courier New" panose="02070309020205020404" pitchFamily="49" charset="0"/>
               </a:rPr>
-              <a:t>superSecretNum</a:t>
+              <a:t>ecretNum</a:t>
             </a:r>
             <a:r>
               <a:rPr kumimoji="0" lang="en-US" altLang="en-US" sz="1600" b="0" i="0" u="none" strike="noStrike" cap="none" normalizeH="0" baseline="0" dirty="0">
@@ -14706,7 +14717,7 @@
                 <a:ea typeface="JetBrains Mono"/>
                 <a:cs typeface="Courier New" panose="02070309020205020404" pitchFamily="49" charset="0"/>
               </a:rPr>
-              <a:t>superSecretNum</a:t>
+              <a:t>secretNum</a:t>
             </a:r>
             <a:r>
               <a:rPr kumimoji="0" lang="en-US" altLang="en-US" sz="1600" b="0" i="0" u="none" strike="noStrike" cap="none" normalizeH="0" baseline="0" dirty="0">
@@ -15390,7 +15401,7 @@
                 <a:ea typeface="JetBrains Mono"/>
                 <a:cs typeface="Courier New" panose="02070309020205020404" pitchFamily="49" charset="0"/>
               </a:rPr>
-              <a:t>superSecretNum</a:t>
+              <a:t>secretNum</a:t>
             </a:r>
             <a:r>
               <a:rPr kumimoji="0" lang="en-US" altLang="en-US" sz="1600" b="0" i="0" u="none" strike="noStrike" cap="none" normalizeH="0" baseline="0" dirty="0">
@@ -16081,7 +16092,7 @@
                 <a:ea typeface="JetBrains Mono"/>
                 <a:cs typeface="Courier New" panose="02070309020205020404" pitchFamily="49" charset="0"/>
               </a:rPr>
-              <a:t>superSecretNum</a:t>
+              <a:t>secretNum</a:t>
             </a:r>
             <a:r>
               <a:rPr kumimoji="0" lang="en-US" altLang="en-US" sz="1600" b="0" i="0" u="none" strike="noStrike" cap="none" normalizeH="0" baseline="0" dirty="0">
@@ -16288,7 +16299,7 @@
                 <a:ea typeface="JetBrains Mono"/>
                 <a:cs typeface="Courier New" panose="02070309020205020404" pitchFamily="49" charset="0"/>
               </a:rPr>
-              <a:t>superSecretNum</a:t>
+              <a:t>secretNum</a:t>
             </a:r>
             <a:r>
               <a:rPr kumimoji="0" lang="en-US" altLang="en-US" sz="1600" b="0" i="0" u="none" strike="noStrike" cap="none" normalizeH="0" baseline="0" dirty="0">
@@ -16615,7 +16626,7 @@
                 <a:ea typeface="JetBrains Mono"/>
                 <a:cs typeface="Courier New" panose="02070309020205020404" pitchFamily="49" charset="0"/>
               </a:rPr>
-              <a:t>superSecretNum</a:t>
+              <a:t>secretNum</a:t>
             </a:r>
             <a:r>
               <a:rPr kumimoji="0" lang="en-US" altLang="en-US" sz="1600" b="0" i="0" u="none" strike="noStrike" cap="none" normalizeH="0" baseline="0" dirty="0">
@@ -16779,7 +16790,7 @@
                 <a:ea typeface="JetBrains Mono"/>
                 <a:cs typeface="Courier New" panose="02070309020205020404" pitchFamily="49" charset="0"/>
               </a:rPr>
-              <a:t>superSecretNum</a:t>
+              <a:t>secretNum</a:t>
             </a:r>
             <a:r>
               <a:rPr kumimoji="0" lang="en-US" altLang="en-US" sz="1600" b="0" i="0" u="none" strike="noStrike" cap="none" normalizeH="0" baseline="0" dirty="0">
@@ -17463,7 +17474,7 @@
                 <a:ea typeface="JetBrains Mono"/>
                 <a:cs typeface="Courier New" panose="02070309020205020404" pitchFamily="49" charset="0"/>
               </a:rPr>
-              <a:t>superSecretNum</a:t>
+              <a:t>secretNum</a:t>
             </a:r>
             <a:r>
               <a:rPr kumimoji="0" lang="en-US" altLang="en-US" sz="1600" b="0" i="0" u="none" strike="noStrike" cap="none" normalizeH="0" baseline="0" dirty="0">
@@ -18233,7 +18244,7 @@
                 </a:solidFill>
                 <a:latin typeface="Consolas" panose="020B0609020204030204" pitchFamily="49" charset="0"/>
               </a:rPr>
-              <a:t>randomNumber</a:t>
+              <a:t>randomNum</a:t>
             </a:r>
             <a:r>
               <a:rPr lang="en-US" sz="1200" dirty="0">
@@ -18270,7 +18281,7 @@
                 </a:solidFill>
                 <a:latin typeface="Consolas" panose="020B0609020204030204" pitchFamily="49" charset="0"/>
               </a:rPr>
-              <a:t>randomNumber</a:t>
+              <a:t>randomNum</a:t>
             </a:r>
             <a:r>
               <a:rPr lang="en-US" sz="1200" dirty="0">
@@ -18364,7 +18375,7 @@
                 </a:solidFill>
                 <a:latin typeface="Consolas" panose="020B0609020204030204" pitchFamily="49" charset="0"/>
               </a:rPr>
-              <a:t>randomNumber</a:t>
+              <a:t>randomNum</a:t>
             </a:r>
             <a:r>
               <a:rPr lang="en-US" sz="1200" dirty="0">
@@ -18533,23 +18544,8 @@
                 </a:solidFill>
                 <a:latin typeface="Consolas" panose="020B0609020204030204" pitchFamily="49" charset="0"/>
               </a:rPr>
-              <a:t> </a:t>
-            </a:r>
-            <a:r>
-              <a:rPr lang="en-US" sz="1200">
-                <a:solidFill>
-                  <a:srgbClr val="000000"/>
-                </a:solidFill>
-                <a:latin typeface="Consolas" panose="020B0609020204030204" pitchFamily="49" charset="0"/>
-              </a:rPr>
-              <a:t>0;</a:t>
-            </a:r>
-            <a:endParaRPr lang="en-US" sz="1200" dirty="0">
-              <a:solidFill>
-                <a:srgbClr val="000000"/>
-              </a:solidFill>
-              <a:latin typeface="Consolas" panose="020B0609020204030204" pitchFamily="49" charset="0"/>
-            </a:endParaRPr>
+              <a:t> 0;</a:t>
+            </a:r>
           </a:p>
           <a:p>
             <a:r>
@@ -19081,7 +19077,7 @@
                 </a:solidFill>
                 <a:latin typeface="Consolas" panose="020B0609020204030204" pitchFamily="49" charset="0"/>
               </a:rPr>
-              <a:t>randomNumber</a:t>
+              <a:t>randomNum</a:t>
             </a:r>
             <a:r>
               <a:rPr lang="en-US" sz="1200" dirty="0">
@@ -19118,7 +19114,7 @@
                 </a:solidFill>
                 <a:latin typeface="Consolas" panose="020B0609020204030204" pitchFamily="49" charset="0"/>
               </a:rPr>
-              <a:t>randomNumber</a:t>
+              <a:t>randomNum</a:t>
             </a:r>
             <a:r>
               <a:rPr lang="en-US" sz="1200" dirty="0">
@@ -19212,7 +19208,7 @@
                 </a:solidFill>
                 <a:latin typeface="Consolas" panose="020B0609020204030204" pitchFamily="49" charset="0"/>
               </a:rPr>
-              <a:t>randomNumber</a:t>
+              <a:t>randomNum</a:t>
             </a:r>
             <a:r>
               <a:rPr lang="en-US" sz="1200" dirty="0">
@@ -20064,12 +20060,6 @@
 </file>
 
 <file path=customXml/item1.xml><?xml version="1.0" encoding="utf-8"?>
-<p:properties xmlns:p="http://schemas.microsoft.com/office/2006/metadata/properties" xmlns:xsi="http://www.w3.org/2001/XMLSchema-instance" xmlns:pc="http://schemas.microsoft.com/office/infopath/2007/PartnerControls">
-  <documentManagement/>
-</p:properties>
-</file>
-
-<file path=customXml/item2.xml><?xml version="1.0" encoding="utf-8"?>
 <ct:contentTypeSchema xmlns:ct="http://schemas.microsoft.com/office/2006/metadata/contentType" xmlns:ma="http://schemas.microsoft.com/office/2006/metadata/properties/metaAttributes" ct:_="" ma:_="" ma:contentTypeName="Document" ma:contentTypeID="0x010100ADD54EED57ED3B409AFF7A8B78DB6D65" ma:contentTypeVersion="9" ma:contentTypeDescription="Create a new document." ma:contentTypeScope="" ma:versionID="83fa564aa38a7fd152d7172ddcca1dc4">
   <xsd:schema xmlns:xsd="http://www.w3.org/2001/XMLSchema" xmlns:xs="http://www.w3.org/2001/XMLSchema" xmlns:p="http://schemas.microsoft.com/office/2006/metadata/properties" xmlns:ns3="f2a5b072-2d94-4a01-8f3f-e026927ea359" targetNamespace="http://schemas.microsoft.com/office/2006/metadata/properties" ma:root="true" ma:fieldsID="c1e87c06ee34cf541b92564514b397d5" ns3:_="">
     <xsd:import namespace="f2a5b072-2d94-4a01-8f3f-e026927ea359"/>
@@ -20247,6 +20237,12 @@
 </ct:contentTypeSchema>
 </file>
 
+<file path=customXml/item2.xml><?xml version="1.0" encoding="utf-8"?>
+<p:properties xmlns:p="http://schemas.microsoft.com/office/2006/metadata/properties" xmlns:xsi="http://www.w3.org/2001/XMLSchema-instance" xmlns:pc="http://schemas.microsoft.com/office/infopath/2007/PartnerControls">
+  <documentManagement/>
+</p:properties>
+</file>
+
 <file path=customXml/item3.xml><?xml version="1.0" encoding="utf-8"?>
 <?mso-contentType ?>
 <FormTemplates xmlns="http://schemas.microsoft.com/sharepoint/v3/contenttype/forms">
@@ -20257,22 +20253,6 @@
 </file>
 
 <file path=customXml/itemProps1.xml><?xml version="1.0" encoding="utf-8"?>
-<ds:datastoreItem xmlns:ds="http://schemas.openxmlformats.org/officeDocument/2006/customXml" ds:itemID="{A365B9CE-3255-46F5-A1CF-99E3357F546A}">
-  <ds:schemaRefs>
-    <ds:schemaRef ds:uri="http://purl.org/dc/terms/"/>
-    <ds:schemaRef ds:uri="http://www.w3.org/XML/1998/namespace"/>
-    <ds:schemaRef ds:uri="http://schemas.openxmlformats.org/package/2006/metadata/core-properties"/>
-    <ds:schemaRef ds:uri="http://schemas.microsoft.com/office/2006/documentManagement/types"/>
-    <ds:schemaRef ds:uri="http://schemas.microsoft.com/office/2006/metadata/properties"/>
-    <ds:schemaRef ds:uri="http://purl.org/dc/elements/1.1/"/>
-    <ds:schemaRef ds:uri="http://purl.org/dc/dcmitype/"/>
-    <ds:schemaRef ds:uri="http://schemas.microsoft.com/office/infopath/2007/PartnerControls"/>
-    <ds:schemaRef ds:uri="f2a5b072-2d94-4a01-8f3f-e026927ea359"/>
-  </ds:schemaRefs>
-</ds:datastoreItem>
-</file>
-
-<file path=customXml/itemProps2.xml><?xml version="1.0" encoding="utf-8"?>
 <ds:datastoreItem xmlns:ds="http://schemas.openxmlformats.org/officeDocument/2006/customXml" ds:itemID="{6EAAF63A-547C-4BDE-816E-D7E69372607C}">
   <ds:schemaRefs>
     <ds:schemaRef ds:uri="http://schemas.microsoft.com/office/2006/metadata/contentType"/>
@@ -20290,6 +20270,22 @@
 </ds:datastoreItem>
 </file>
 
+<file path=customXml/itemProps2.xml><?xml version="1.0" encoding="utf-8"?>
+<ds:datastoreItem xmlns:ds="http://schemas.openxmlformats.org/officeDocument/2006/customXml" ds:itemID="{A365B9CE-3255-46F5-A1CF-99E3357F546A}">
+  <ds:schemaRefs>
+    <ds:schemaRef ds:uri="http://purl.org/dc/terms/"/>
+    <ds:schemaRef ds:uri="http://www.w3.org/XML/1998/namespace"/>
+    <ds:schemaRef ds:uri="http://schemas.openxmlformats.org/package/2006/metadata/core-properties"/>
+    <ds:schemaRef ds:uri="http://schemas.microsoft.com/office/2006/documentManagement/types"/>
+    <ds:schemaRef ds:uri="http://schemas.microsoft.com/office/2006/metadata/properties"/>
+    <ds:schemaRef ds:uri="http://purl.org/dc/elements/1.1/"/>
+    <ds:schemaRef ds:uri="http://purl.org/dc/dcmitype/"/>
+    <ds:schemaRef ds:uri="http://schemas.microsoft.com/office/infopath/2007/PartnerControls"/>
+    <ds:schemaRef ds:uri="f2a5b072-2d94-4a01-8f3f-e026927ea359"/>
+  </ds:schemaRefs>
+</ds:datastoreItem>
+</file>
+
 <file path=customXml/itemProps3.xml><?xml version="1.0" encoding="utf-8"?>
 <ds:datastoreItem xmlns:ds="http://schemas.openxmlformats.org/officeDocument/2006/customXml" ds:itemID="{C5139DC6-B8C3-441B-AE1D-5F19DE2804E3}">
   <ds:schemaRefs>

</xml_diff>